<commit_message>
Added Final report and presentations
</commit_message>
<xml_diff>
--- a/US accident analysis - business part - Team 14.pptx
+++ b/US accident analysis - business part - Team 14.pptx
@@ -10,7 +10,7 @@
     <p:notesMasterId r:id="rId38"/>
   </p:notesMasterIdLst>
   <p:sldIdLst>
-    <p:sldId id="256" r:id="rId4"/>
+    <p:sldId id="335" r:id="rId4"/>
     <p:sldId id="277" r:id="rId5"/>
     <p:sldId id="257" r:id="rId6"/>
     <p:sldId id="305" r:id="rId7"/>
@@ -147,7 +147,7 @@
       <p14:sectionLst xmlns:p14="http://schemas.microsoft.com/office/powerpoint/2010/main">
         <p14:section name="Presentation" id="{93397B5D-379A-4C6E-8435-E4A44DDEF27B}">
           <p14:sldIdLst>
-            <p14:sldId id="256"/>
+            <p14:sldId id="335"/>
             <p14:sldId id="277"/>
             <p14:sldId id="257"/>
             <p14:sldId id="305"/>
@@ -2719,13 +2719,13 @@
   <p:clrMapOvr>
     <a:masterClrMapping/>
   </p:clrMapOvr>
-  <mc:AlternateContent xmlns:mc="http://schemas.openxmlformats.org/markup-compatibility/2006">
-    <mc:Choice xmlns:p14="http://schemas.microsoft.com/office/powerpoint/2010/main" Requires="p14">
+  <mc:AlternateContent xmlns:mc="http://schemas.openxmlformats.org/markup-compatibility/2006" xmlns:p14="http://schemas.microsoft.com/office/powerpoint/2010/main">
+    <mc:Choice Requires="p14">
       <p:transition p14:dur="250">
         <p:fade/>
       </p:transition>
     </mc:Choice>
-    <mc:Fallback>
+    <mc:Fallback xmlns="">
       <p:transition>
         <p:fade/>
       </p:transition>
@@ -2930,13 +2930,13 @@
   <p:clrMapOvr>
     <a:masterClrMapping/>
   </p:clrMapOvr>
-  <mc:AlternateContent xmlns:mc="http://schemas.openxmlformats.org/markup-compatibility/2006">
-    <mc:Choice xmlns:p14="http://schemas.microsoft.com/office/powerpoint/2010/main" Requires="p14">
+  <mc:AlternateContent xmlns:mc="http://schemas.openxmlformats.org/markup-compatibility/2006" xmlns:p14="http://schemas.microsoft.com/office/powerpoint/2010/main">
+    <mc:Choice Requires="p14">
       <p:transition p14:dur="250">
         <p:fade/>
       </p:transition>
     </mc:Choice>
-    <mc:Fallback>
+    <mc:Fallback xmlns="">
       <p:transition>
         <p:fade/>
       </p:transition>
@@ -3265,13 +3265,13 @@
   <p:clrMapOvr>
     <a:masterClrMapping/>
   </p:clrMapOvr>
-  <mc:AlternateContent xmlns:mc="http://schemas.openxmlformats.org/markup-compatibility/2006">
-    <mc:Choice xmlns:p14="http://schemas.microsoft.com/office/powerpoint/2010/main" Requires="p14">
+  <mc:AlternateContent xmlns:mc="http://schemas.openxmlformats.org/markup-compatibility/2006" xmlns:p14="http://schemas.microsoft.com/office/powerpoint/2010/main">
+    <mc:Choice Requires="p14">
       <p:transition p14:dur="250">
         <p:fade/>
       </p:transition>
     </mc:Choice>
-    <mc:Fallback>
+    <mc:Fallback xmlns="">
       <p:transition>
         <p:fade/>
       </p:transition>
@@ -3565,13 +3565,13 @@
   <p:clrMapOvr>
     <a:overrideClrMapping bg1="dk1" tx1="lt1" bg2="dk2" tx2="lt2" accent1="accent1" accent2="accent2" accent3="accent3" accent4="accent4" accent5="accent5" accent6="accent6" hlink="hlink" folHlink="folHlink"/>
   </p:clrMapOvr>
-  <mc:AlternateContent xmlns:mc="http://schemas.openxmlformats.org/markup-compatibility/2006">
-    <mc:Choice xmlns:p14="http://schemas.microsoft.com/office/powerpoint/2010/main" Requires="p14">
+  <mc:AlternateContent xmlns:mc="http://schemas.openxmlformats.org/markup-compatibility/2006" xmlns:p14="http://schemas.microsoft.com/office/powerpoint/2010/main">
+    <mc:Choice Requires="p14">
       <p:transition p14:dur="250">
         <p:fade/>
       </p:transition>
     </mc:Choice>
-    <mc:Fallback>
+    <mc:Fallback xmlns="">
       <p:transition>
         <p:fade/>
       </p:transition>
@@ -3749,13 +3749,13 @@
   <p:clrMapOvr>
     <a:masterClrMapping/>
   </p:clrMapOvr>
-  <mc:AlternateContent xmlns:mc="http://schemas.openxmlformats.org/markup-compatibility/2006">
-    <mc:Choice xmlns:p14="http://schemas.microsoft.com/office/powerpoint/2010/main" Requires="p14">
+  <mc:AlternateContent xmlns:mc="http://schemas.openxmlformats.org/markup-compatibility/2006" xmlns:p14="http://schemas.microsoft.com/office/powerpoint/2010/main">
+    <mc:Choice Requires="p14">
       <p:transition p14:dur="250">
         <p:fade/>
       </p:transition>
     </mc:Choice>
-    <mc:Fallback>
+    <mc:Fallback xmlns="">
       <p:transition>
         <p:fade/>
       </p:transition>
@@ -4055,13 +4055,13 @@
   <p:clrMapOvr>
     <a:masterClrMapping/>
   </p:clrMapOvr>
-  <mc:AlternateContent xmlns:mc="http://schemas.openxmlformats.org/markup-compatibility/2006">
-    <mc:Choice xmlns:p14="http://schemas.microsoft.com/office/powerpoint/2010/main" Requires="p14">
+  <mc:AlternateContent xmlns:mc="http://schemas.openxmlformats.org/markup-compatibility/2006" xmlns:p14="http://schemas.microsoft.com/office/powerpoint/2010/main">
+    <mc:Choice Requires="p14">
       <p:transition p14:dur="250">
         <p:fade/>
       </p:transition>
     </mc:Choice>
-    <mc:Fallback>
+    <mc:Fallback xmlns="">
       <p:transition>
         <p:fade/>
       </p:transition>
@@ -4357,13 +4357,13 @@
   <p:clrMapOvr>
     <a:masterClrMapping/>
   </p:clrMapOvr>
-  <mc:AlternateContent xmlns:mc="http://schemas.openxmlformats.org/markup-compatibility/2006">
-    <mc:Choice xmlns:p14="http://schemas.microsoft.com/office/powerpoint/2010/main" Requires="p14">
+  <mc:AlternateContent xmlns:mc="http://schemas.openxmlformats.org/markup-compatibility/2006" xmlns:p14="http://schemas.microsoft.com/office/powerpoint/2010/main">
+    <mc:Choice Requires="p14">
       <p:transition p14:dur="250">
         <p:fade/>
       </p:transition>
     </mc:Choice>
-    <mc:Fallback>
+    <mc:Fallback xmlns="">
       <p:transition>
         <p:fade/>
       </p:transition>
@@ -4822,13 +4822,13 @@
   <p:clrMapOvr>
     <a:masterClrMapping/>
   </p:clrMapOvr>
-  <mc:AlternateContent xmlns:mc="http://schemas.openxmlformats.org/markup-compatibility/2006">
-    <mc:Choice xmlns:p14="http://schemas.microsoft.com/office/powerpoint/2010/main" Requires="p14">
+  <mc:AlternateContent xmlns:mc="http://schemas.openxmlformats.org/markup-compatibility/2006" xmlns:p14="http://schemas.microsoft.com/office/powerpoint/2010/main">
+    <mc:Choice Requires="p14">
       <p:transition p14:dur="250">
         <p:fade/>
       </p:transition>
     </mc:Choice>
-    <mc:Fallback>
+    <mc:Fallback xmlns="">
       <p:transition>
         <p:fade/>
       </p:transition>
@@ -4954,13 +4954,13 @@
   <p:clrMapOvr>
     <a:masterClrMapping/>
   </p:clrMapOvr>
-  <mc:AlternateContent xmlns:mc="http://schemas.openxmlformats.org/markup-compatibility/2006">
-    <mc:Choice xmlns:p14="http://schemas.microsoft.com/office/powerpoint/2010/main" Requires="p14">
+  <mc:AlternateContent xmlns:mc="http://schemas.openxmlformats.org/markup-compatibility/2006" xmlns:p14="http://schemas.microsoft.com/office/powerpoint/2010/main">
+    <mc:Choice Requires="p14">
       <p:transition p14:dur="250">
         <p:fade/>
       </p:transition>
     </mc:Choice>
-    <mc:Fallback>
+    <mc:Fallback xmlns="">
       <p:transition>
         <p:fade/>
       </p:transition>
@@ -5063,13 +5063,13 @@
   <p:clrMapOvr>
     <a:masterClrMapping/>
   </p:clrMapOvr>
-  <mc:AlternateContent xmlns:mc="http://schemas.openxmlformats.org/markup-compatibility/2006">
-    <mc:Choice xmlns:p14="http://schemas.microsoft.com/office/powerpoint/2010/main" Requires="p14">
+  <mc:AlternateContent xmlns:mc="http://schemas.openxmlformats.org/markup-compatibility/2006" xmlns:p14="http://schemas.microsoft.com/office/powerpoint/2010/main">
+    <mc:Choice Requires="p14">
       <p:transition p14:dur="250">
         <p:fade/>
       </p:transition>
     </mc:Choice>
-    <mc:Fallback>
+    <mc:Fallback xmlns="">
       <p:transition>
         <p:fade/>
       </p:transition>
@@ -5364,13 +5364,13 @@
   <p:clrMapOvr>
     <a:masterClrMapping/>
   </p:clrMapOvr>
-  <mc:AlternateContent xmlns:mc="http://schemas.openxmlformats.org/markup-compatibility/2006">
-    <mc:Choice xmlns:p14="http://schemas.microsoft.com/office/powerpoint/2010/main" Requires="p14">
+  <mc:AlternateContent xmlns:mc="http://schemas.openxmlformats.org/markup-compatibility/2006" xmlns:p14="http://schemas.microsoft.com/office/powerpoint/2010/main">
+    <mc:Choice Requires="p14">
       <p:transition p14:dur="250">
         <p:fade/>
       </p:transition>
     </mc:Choice>
-    <mc:Fallback>
+    <mc:Fallback xmlns="">
       <p:transition>
         <p:fade/>
       </p:transition>
@@ -5576,13 +5576,13 @@
   <p:clrMapOvr>
     <a:masterClrMapping/>
   </p:clrMapOvr>
-  <mc:AlternateContent xmlns:mc="http://schemas.openxmlformats.org/markup-compatibility/2006">
-    <mc:Choice xmlns:p14="http://schemas.microsoft.com/office/powerpoint/2010/main" Requires="p14">
+  <mc:AlternateContent xmlns:mc="http://schemas.openxmlformats.org/markup-compatibility/2006" xmlns:p14="http://schemas.microsoft.com/office/powerpoint/2010/main">
+    <mc:Choice Requires="p14">
       <p:transition p14:dur="250">
         <p:fade/>
       </p:transition>
     </mc:Choice>
-    <mc:Fallback>
+    <mc:Fallback xmlns="">
       <p:transition>
         <p:fade/>
       </p:transition>
@@ -5911,13 +5911,13 @@
   <p:clrMapOvr>
     <a:masterClrMapping/>
   </p:clrMapOvr>
-  <mc:AlternateContent xmlns:mc="http://schemas.openxmlformats.org/markup-compatibility/2006">
-    <mc:Choice xmlns:p14="http://schemas.microsoft.com/office/powerpoint/2010/main" Requires="p14">
+  <mc:AlternateContent xmlns:mc="http://schemas.openxmlformats.org/markup-compatibility/2006" xmlns:p14="http://schemas.microsoft.com/office/powerpoint/2010/main">
+    <mc:Choice Requires="p14">
       <p:transition p14:dur="250">
         <p:fade/>
       </p:transition>
     </mc:Choice>
-    <mc:Fallback>
+    <mc:Fallback xmlns="">
       <p:transition>
         <p:fade/>
       </p:transition>
@@ -6095,13 +6095,13 @@
   <p:clrMapOvr>
     <a:masterClrMapping/>
   </p:clrMapOvr>
-  <mc:AlternateContent xmlns:mc="http://schemas.openxmlformats.org/markup-compatibility/2006">
-    <mc:Choice xmlns:p14="http://schemas.microsoft.com/office/powerpoint/2010/main" Requires="p14">
+  <mc:AlternateContent xmlns:mc="http://schemas.openxmlformats.org/markup-compatibility/2006" xmlns:p14="http://schemas.microsoft.com/office/powerpoint/2010/main">
+    <mc:Choice Requires="p14">
       <p:transition p14:dur="250">
         <p:fade/>
       </p:transition>
     </mc:Choice>
-    <mc:Fallback>
+    <mc:Fallback xmlns="">
       <p:transition>
         <p:fade/>
       </p:transition>
@@ -6289,13 +6289,13 @@
   <p:clrMapOvr>
     <a:masterClrMapping/>
   </p:clrMapOvr>
-  <mc:AlternateContent xmlns:mc="http://schemas.openxmlformats.org/markup-compatibility/2006">
-    <mc:Choice xmlns:p14="http://schemas.microsoft.com/office/powerpoint/2010/main" Requires="p14">
+  <mc:AlternateContent xmlns:mc="http://schemas.openxmlformats.org/markup-compatibility/2006" xmlns:p14="http://schemas.microsoft.com/office/powerpoint/2010/main">
+    <mc:Choice Requires="p14">
       <p:transition p14:dur="250">
         <p:fade/>
       </p:transition>
     </mc:Choice>
-    <mc:Fallback>
+    <mc:Fallback xmlns="">
       <p:transition>
         <p:fade/>
       </p:transition>
@@ -6836,13 +6836,13 @@
   <p:clrMapOvr>
     <a:masterClrMapping/>
   </p:clrMapOvr>
-  <mc:AlternateContent xmlns:mc="http://schemas.openxmlformats.org/markup-compatibility/2006">
-    <mc:Choice xmlns:p14="http://schemas.microsoft.com/office/powerpoint/2010/main" Requires="p14">
+  <mc:AlternateContent xmlns:mc="http://schemas.openxmlformats.org/markup-compatibility/2006" xmlns:p14="http://schemas.microsoft.com/office/powerpoint/2010/main">
+    <mc:Choice Requires="p14">
       <p:transition p14:dur="250">
         <p:fade/>
       </p:transition>
     </mc:Choice>
-    <mc:Fallback>
+    <mc:Fallback xmlns="">
       <p:transition>
         <p:fade/>
       </p:transition>
@@ -10669,13 +10669,13 @@
   <p:clrMapOvr>
     <a:masterClrMapping/>
   </p:clrMapOvr>
-  <mc:AlternateContent xmlns:mc="http://schemas.openxmlformats.org/markup-compatibility/2006">
-    <mc:Choice xmlns:p14="http://schemas.microsoft.com/office/powerpoint/2010/main" Requires="p14">
+  <mc:AlternateContent xmlns:mc="http://schemas.openxmlformats.org/markup-compatibility/2006" xmlns:p14="http://schemas.microsoft.com/office/powerpoint/2010/main">
+    <mc:Choice Requires="p14">
       <p:transition p14:dur="250">
         <p:fade/>
       </p:transition>
     </mc:Choice>
-    <mc:Fallback>
+    <mc:Fallback xmlns="">
       <p:transition>
         <p:fade/>
       </p:transition>
@@ -11063,13 +11063,13 @@
   <p:clrMapOvr>
     <a:masterClrMapping/>
   </p:clrMapOvr>
-  <mc:AlternateContent xmlns:mc="http://schemas.openxmlformats.org/markup-compatibility/2006">
-    <mc:Choice xmlns:p14="http://schemas.microsoft.com/office/powerpoint/2010/main" Requires="p14">
+  <mc:AlternateContent xmlns:mc="http://schemas.openxmlformats.org/markup-compatibility/2006" xmlns:p14="http://schemas.microsoft.com/office/powerpoint/2010/main">
+    <mc:Choice Requires="p14">
       <p:transition p14:dur="250">
         <p:fade/>
       </p:transition>
     </mc:Choice>
-    <mc:Fallback>
+    <mc:Fallback xmlns="">
       <p:transition>
         <p:fade/>
       </p:transition>
@@ -11559,13 +11559,13 @@
   <p:clrMapOvr>
     <a:masterClrMapping/>
   </p:clrMapOvr>
-  <mc:AlternateContent xmlns:mc="http://schemas.openxmlformats.org/markup-compatibility/2006">
-    <mc:Choice xmlns:p14="http://schemas.microsoft.com/office/powerpoint/2010/main" Requires="p14">
+  <mc:AlternateContent xmlns:mc="http://schemas.openxmlformats.org/markup-compatibility/2006" xmlns:p14="http://schemas.microsoft.com/office/powerpoint/2010/main">
+    <mc:Choice Requires="p14">
       <p:transition p14:dur="250">
         <p:fade/>
       </p:transition>
     </mc:Choice>
-    <mc:Fallback>
+    <mc:Fallback xmlns="">
       <p:transition>
         <p:fade/>
       </p:transition>
@@ -12001,13 +12001,13 @@
   <p:clrMapOvr>
     <a:masterClrMapping/>
   </p:clrMapOvr>
-  <mc:AlternateContent xmlns:mc="http://schemas.openxmlformats.org/markup-compatibility/2006">
-    <mc:Choice xmlns:p14="http://schemas.microsoft.com/office/powerpoint/2010/main" Requires="p14">
+  <mc:AlternateContent xmlns:mc="http://schemas.openxmlformats.org/markup-compatibility/2006" xmlns:p14="http://schemas.microsoft.com/office/powerpoint/2010/main">
+    <mc:Choice Requires="p14">
       <p:transition p14:dur="250">
         <p:fade/>
       </p:transition>
     </mc:Choice>
-    <mc:Fallback>
+    <mc:Fallback xmlns="">
       <p:transition>
         <p:fade/>
       </p:transition>
@@ -12789,13 +12789,13 @@
   <p:clrMapOvr>
     <a:masterClrMapping/>
   </p:clrMapOvr>
-  <mc:AlternateContent xmlns:mc="http://schemas.openxmlformats.org/markup-compatibility/2006">
-    <mc:Choice xmlns:p14="http://schemas.microsoft.com/office/powerpoint/2010/main" Requires="p14">
+  <mc:AlternateContent xmlns:mc="http://schemas.openxmlformats.org/markup-compatibility/2006" xmlns:p14="http://schemas.microsoft.com/office/powerpoint/2010/main">
+    <mc:Choice Requires="p14">
       <p:transition p14:dur="250">
         <p:fade/>
       </p:transition>
     </mc:Choice>
-    <mc:Fallback>
+    <mc:Fallback xmlns="">
       <p:transition>
         <p:fade/>
       </p:transition>
@@ -13425,13 +13425,13 @@
   <p:clrMapOvr>
     <a:masterClrMapping/>
   </p:clrMapOvr>
-  <mc:AlternateContent xmlns:mc="http://schemas.openxmlformats.org/markup-compatibility/2006">
-    <mc:Choice xmlns:p14="http://schemas.microsoft.com/office/powerpoint/2010/main" Requires="p14">
+  <mc:AlternateContent xmlns:mc="http://schemas.openxmlformats.org/markup-compatibility/2006" xmlns:p14="http://schemas.microsoft.com/office/powerpoint/2010/main">
+    <mc:Choice Requires="p14">
       <p:transition p14:dur="250">
         <p:fade/>
       </p:transition>
     </mc:Choice>
-    <mc:Fallback>
+    <mc:Fallback xmlns="">
       <p:transition>
         <p:fade/>
       </p:transition>
@@ -13726,13 +13726,13 @@
   <p:clrMapOvr>
     <a:masterClrMapping/>
   </p:clrMapOvr>
-  <mc:AlternateContent xmlns:mc="http://schemas.openxmlformats.org/markup-compatibility/2006">
-    <mc:Choice xmlns:p14="http://schemas.microsoft.com/office/powerpoint/2010/main" Requires="p14">
+  <mc:AlternateContent xmlns:mc="http://schemas.openxmlformats.org/markup-compatibility/2006" xmlns:p14="http://schemas.microsoft.com/office/powerpoint/2010/main">
+    <mc:Choice Requires="p14">
       <p:transition p14:dur="250">
         <p:fade/>
       </p:transition>
     </mc:Choice>
-    <mc:Fallback>
+    <mc:Fallback xmlns="">
       <p:transition>
         <p:fade/>
       </p:transition>
@@ -15273,13 +15273,13 @@
   <p:clrMapOvr>
     <a:masterClrMapping/>
   </p:clrMapOvr>
-  <mc:AlternateContent xmlns:mc="http://schemas.openxmlformats.org/markup-compatibility/2006">
-    <mc:Choice xmlns:p14="http://schemas.microsoft.com/office/powerpoint/2010/main" Requires="p14">
+  <mc:AlternateContent xmlns:mc="http://schemas.openxmlformats.org/markup-compatibility/2006" xmlns:p14="http://schemas.microsoft.com/office/powerpoint/2010/main">
+    <mc:Choice Requires="p14">
       <p:transition p14:dur="250">
         <p:fade/>
       </p:transition>
     </mc:Choice>
-    <mc:Fallback>
+    <mc:Fallback xmlns="">
       <p:transition>
         <p:fade/>
       </p:transition>
@@ -15498,13 +15498,13 @@
   <p:clrMapOvr>
     <a:masterClrMapping/>
   </p:clrMapOvr>
-  <mc:AlternateContent xmlns:mc="http://schemas.openxmlformats.org/markup-compatibility/2006">
-    <mc:Choice xmlns:p14="http://schemas.microsoft.com/office/powerpoint/2010/main" Requires="p14">
+  <mc:AlternateContent xmlns:mc="http://schemas.openxmlformats.org/markup-compatibility/2006" xmlns:p14="http://schemas.microsoft.com/office/powerpoint/2010/main">
+    <mc:Choice Requires="p14">
       <p:transition p14:dur="250">
         <p:fade/>
       </p:transition>
     </mc:Choice>
-    <mc:Fallback>
+    <mc:Fallback xmlns="">
       <p:transition>
         <p:fade/>
       </p:transition>
@@ -15723,13 +15723,13 @@
   <p:clrMapOvr>
     <a:masterClrMapping/>
   </p:clrMapOvr>
-  <mc:AlternateContent xmlns:mc="http://schemas.openxmlformats.org/markup-compatibility/2006">
-    <mc:Choice xmlns:p14="http://schemas.microsoft.com/office/powerpoint/2010/main" Requires="p14">
+  <mc:AlternateContent xmlns:mc="http://schemas.openxmlformats.org/markup-compatibility/2006" xmlns:p14="http://schemas.microsoft.com/office/powerpoint/2010/main">
+    <mc:Choice Requires="p14">
       <p:transition p14:dur="250">
         <p:fade/>
       </p:transition>
     </mc:Choice>
-    <mc:Fallback>
+    <mc:Fallback xmlns="">
       <p:transition>
         <p:fade/>
       </p:transition>
@@ -15948,13 +15948,13 @@
   <p:clrMapOvr>
     <a:masterClrMapping/>
   </p:clrMapOvr>
-  <mc:AlternateContent xmlns:mc="http://schemas.openxmlformats.org/markup-compatibility/2006">
-    <mc:Choice xmlns:p14="http://schemas.microsoft.com/office/powerpoint/2010/main" Requires="p14">
+  <mc:AlternateContent xmlns:mc="http://schemas.openxmlformats.org/markup-compatibility/2006" xmlns:p14="http://schemas.microsoft.com/office/powerpoint/2010/main">
+    <mc:Choice Requires="p14">
       <p:transition p14:dur="250">
         <p:fade/>
       </p:transition>
     </mc:Choice>
-    <mc:Fallback>
+    <mc:Fallback xmlns="">
       <p:transition>
         <p:fade/>
       </p:transition>
@@ -16496,13 +16496,13 @@
   <p:clrMapOvr>
     <a:masterClrMapping/>
   </p:clrMapOvr>
-  <mc:AlternateContent xmlns:mc="http://schemas.openxmlformats.org/markup-compatibility/2006">
-    <mc:Choice xmlns:p14="http://schemas.microsoft.com/office/powerpoint/2010/main" Requires="p14">
+  <mc:AlternateContent xmlns:mc="http://schemas.openxmlformats.org/markup-compatibility/2006" xmlns:p14="http://schemas.microsoft.com/office/powerpoint/2010/main">
+    <mc:Choice Requires="p14">
       <p:transition p14:dur="250">
         <p:fade/>
       </p:transition>
     </mc:Choice>
-    <mc:Fallback>
+    <mc:Fallback xmlns="">
       <p:transition>
         <p:fade/>
       </p:transition>
@@ -16959,13 +16959,13 @@
   <p:clrMapOvr>
     <a:masterClrMapping/>
   </p:clrMapOvr>
-  <mc:AlternateContent xmlns:mc="http://schemas.openxmlformats.org/markup-compatibility/2006">
-    <mc:Choice xmlns:p14="http://schemas.microsoft.com/office/powerpoint/2010/main" Requires="p14">
+  <mc:AlternateContent xmlns:mc="http://schemas.openxmlformats.org/markup-compatibility/2006" xmlns:p14="http://schemas.microsoft.com/office/powerpoint/2010/main">
+    <mc:Choice Requires="p14">
       <p:transition p14:dur="250">
         <p:fade/>
       </p:transition>
     </mc:Choice>
-    <mc:Fallback>
+    <mc:Fallback xmlns="">
       <p:transition>
         <p:fade/>
       </p:transition>
@@ -17485,13 +17485,13 @@
   <p:clrMapOvr>
     <a:masterClrMapping/>
   </p:clrMapOvr>
-  <mc:AlternateContent xmlns:mc="http://schemas.openxmlformats.org/markup-compatibility/2006">
-    <mc:Choice xmlns:p14="http://schemas.microsoft.com/office/powerpoint/2010/main" Requires="p14">
+  <mc:AlternateContent xmlns:mc="http://schemas.openxmlformats.org/markup-compatibility/2006" xmlns:p14="http://schemas.microsoft.com/office/powerpoint/2010/main">
+    <mc:Choice Requires="p14">
       <p:transition p14:dur="250">
         <p:fade/>
       </p:transition>
     </mc:Choice>
-    <mc:Fallback>
+    <mc:Fallback xmlns="">
       <p:transition>
         <p:fade/>
       </p:transition>
@@ -17533,13 +17533,13 @@
   <p:clrMapOvr>
     <a:masterClrMapping/>
   </p:clrMapOvr>
-  <mc:AlternateContent xmlns:mc="http://schemas.openxmlformats.org/markup-compatibility/2006">
-    <mc:Choice xmlns:p14="http://schemas.microsoft.com/office/powerpoint/2010/main" Requires="p14">
+  <mc:AlternateContent xmlns:mc="http://schemas.openxmlformats.org/markup-compatibility/2006" xmlns:p14="http://schemas.microsoft.com/office/powerpoint/2010/main">
+    <mc:Choice Requires="p14">
       <p:transition p14:dur="250">
         <p:fade/>
       </p:transition>
     </mc:Choice>
-    <mc:Fallback>
+    <mc:Fallback xmlns="">
       <p:transition>
         <p:fade/>
       </p:transition>
@@ -17904,13 +17904,13 @@
   <p:clrMapOvr>
     <a:masterClrMapping/>
   </p:clrMapOvr>
-  <mc:AlternateContent xmlns:mc="http://schemas.openxmlformats.org/markup-compatibility/2006">
-    <mc:Choice xmlns:p14="http://schemas.microsoft.com/office/powerpoint/2010/main" Requires="p14">
+  <mc:AlternateContent xmlns:mc="http://schemas.openxmlformats.org/markup-compatibility/2006" xmlns:p14="http://schemas.microsoft.com/office/powerpoint/2010/main">
+    <mc:Choice Requires="p14">
       <p:transition p14:dur="250">
         <p:fade/>
       </p:transition>
     </mc:Choice>
-    <mc:Fallback>
+    <mc:Fallback xmlns="">
       <p:transition>
         <p:fade/>
       </p:transition>
@@ -18188,13 +18188,13 @@
   <p:clrMapOvr>
     <a:masterClrMapping/>
   </p:clrMapOvr>
-  <mc:AlternateContent xmlns:mc="http://schemas.openxmlformats.org/markup-compatibility/2006">
-    <mc:Choice xmlns:p14="http://schemas.microsoft.com/office/powerpoint/2010/main" Requires="p14">
+  <mc:AlternateContent xmlns:mc="http://schemas.openxmlformats.org/markup-compatibility/2006" xmlns:p14="http://schemas.microsoft.com/office/powerpoint/2010/main">
+    <mc:Choice Requires="p14">
       <p:transition p14:dur="250">
         <p:fade/>
       </p:transition>
     </mc:Choice>
-    <mc:Fallback>
+    <mc:Fallback xmlns="">
       <p:transition>
         <p:fade/>
       </p:transition>
@@ -18758,13 +18758,13 @@
   <p:clrMapOvr>
     <a:masterClrMapping/>
   </p:clrMapOvr>
-  <mc:AlternateContent xmlns:mc="http://schemas.openxmlformats.org/markup-compatibility/2006">
-    <mc:Choice xmlns:p14="http://schemas.microsoft.com/office/powerpoint/2010/main" Requires="p14">
+  <mc:AlternateContent xmlns:mc="http://schemas.openxmlformats.org/markup-compatibility/2006" xmlns:p14="http://schemas.microsoft.com/office/powerpoint/2010/main">
+    <mc:Choice Requires="p14">
       <p:transition p14:dur="250">
         <p:fade/>
       </p:transition>
     </mc:Choice>
-    <mc:Fallback>
+    <mc:Fallback xmlns="">
       <p:transition>
         <p:fade/>
       </p:transition>
@@ -18912,13 +18912,13 @@
   <p:clrMapOvr>
     <a:masterClrMapping/>
   </p:clrMapOvr>
-  <mc:AlternateContent xmlns:mc="http://schemas.openxmlformats.org/markup-compatibility/2006">
-    <mc:Choice xmlns:p14="http://schemas.microsoft.com/office/powerpoint/2010/main" Requires="p14">
+  <mc:AlternateContent xmlns:mc="http://schemas.openxmlformats.org/markup-compatibility/2006" xmlns:p14="http://schemas.microsoft.com/office/powerpoint/2010/main">
+    <mc:Choice Requires="p14">
       <p:transition p14:dur="250">
         <p:fade/>
       </p:transition>
     </mc:Choice>
-    <mc:Fallback>
+    <mc:Fallback xmlns="">
       <p:transition>
         <p:fade/>
       </p:transition>
@@ -19037,13 +19037,13 @@
   <p:clrMapOvr>
     <a:masterClrMapping/>
   </p:clrMapOvr>
-  <mc:AlternateContent xmlns:mc="http://schemas.openxmlformats.org/markup-compatibility/2006">
-    <mc:Choice xmlns:p14="http://schemas.microsoft.com/office/powerpoint/2010/main" Requires="p14">
+  <mc:AlternateContent xmlns:mc="http://schemas.openxmlformats.org/markup-compatibility/2006" xmlns:p14="http://schemas.microsoft.com/office/powerpoint/2010/main">
+    <mc:Choice Requires="p14">
       <p:transition p14:dur="250">
         <p:fade/>
       </p:transition>
     </mc:Choice>
-    <mc:Fallback>
+    <mc:Fallback xmlns="">
       <p:transition>
         <p:fade/>
       </p:transition>
@@ -19368,13 +19368,13 @@
   <p:clrMapOvr>
     <a:masterClrMapping/>
   </p:clrMapOvr>
-  <mc:AlternateContent xmlns:mc="http://schemas.openxmlformats.org/markup-compatibility/2006">
-    <mc:Choice xmlns:p14="http://schemas.microsoft.com/office/powerpoint/2010/main" Requires="p14">
+  <mc:AlternateContent xmlns:mc="http://schemas.openxmlformats.org/markup-compatibility/2006" xmlns:p14="http://schemas.microsoft.com/office/powerpoint/2010/main">
+    <mc:Choice Requires="p14">
       <p:transition p14:dur="250">
         <p:fade/>
       </p:transition>
     </mc:Choice>
-    <mc:Fallback>
+    <mc:Fallback xmlns="">
       <p:transition>
         <p:fade/>
       </p:transition>
@@ -19715,13 +19715,13 @@
   <p:clrMapOvr>
     <a:masterClrMapping/>
   </p:clrMapOvr>
-  <mc:AlternateContent xmlns:mc="http://schemas.openxmlformats.org/markup-compatibility/2006">
-    <mc:Choice xmlns:p14="http://schemas.microsoft.com/office/powerpoint/2010/main" Requires="p14">
+  <mc:AlternateContent xmlns:mc="http://schemas.openxmlformats.org/markup-compatibility/2006" xmlns:p14="http://schemas.microsoft.com/office/powerpoint/2010/main">
+    <mc:Choice Requires="p14">
       <p:transition p14:dur="250">
         <p:fade/>
       </p:transition>
     </mc:Choice>
-    <mc:Fallback>
+    <mc:Fallback xmlns="">
       <p:transition>
         <p:fade/>
       </p:transition>
@@ -20064,13 +20064,13 @@
     <p:sldLayoutId id="2147483662" r:id="rId10"/>
     <p:sldLayoutId id="2147483661" r:id="rId11"/>
   </p:sldLayoutIdLst>
-  <mc:AlternateContent xmlns:mc="http://schemas.openxmlformats.org/markup-compatibility/2006">
-    <mc:Choice xmlns:p14="http://schemas.microsoft.com/office/powerpoint/2010/main" Requires="p14">
+  <mc:AlternateContent xmlns:mc="http://schemas.openxmlformats.org/markup-compatibility/2006" xmlns:p14="http://schemas.microsoft.com/office/powerpoint/2010/main">
+    <mc:Choice Requires="p14">
       <p:transition p14:dur="250">
         <p:fade/>
       </p:transition>
     </mc:Choice>
-    <mc:Fallback>
+    <mc:Fallback xmlns="">
       <p:transition>
         <p:fade/>
       </p:transition>
@@ -20663,13 +20663,13 @@
     <p:sldLayoutId id="2147483910" r:id="rId10"/>
     <p:sldLayoutId id="2147483911" r:id="rId11"/>
   </p:sldLayoutIdLst>
-  <mc:AlternateContent xmlns:mc="http://schemas.openxmlformats.org/markup-compatibility/2006">
-    <mc:Choice xmlns:p14="http://schemas.microsoft.com/office/powerpoint/2010/main" Requires="p14">
+  <mc:AlternateContent xmlns:mc="http://schemas.openxmlformats.org/markup-compatibility/2006" xmlns:p14="http://schemas.microsoft.com/office/powerpoint/2010/main">
+    <mc:Choice Requires="p14">
       <p:transition p14:dur="250">
         <p:fade/>
       </p:transition>
     </mc:Choice>
-    <mc:Fallback>
+    <mc:Fallback xmlns="">
       <p:transition>
         <p:fade/>
       </p:transition>
@@ -21603,13 +21603,13 @@
     <p:sldLayoutId id="2147483927" r:id="rId15"/>
     <p:sldLayoutId id="2147483928" r:id="rId16"/>
   </p:sldLayoutIdLst>
-  <mc:AlternateContent xmlns:mc="http://schemas.openxmlformats.org/markup-compatibility/2006">
-    <mc:Choice xmlns:p14="http://schemas.microsoft.com/office/powerpoint/2010/main" Requires="p14">
+  <mc:AlternateContent xmlns:mc="http://schemas.openxmlformats.org/markup-compatibility/2006" xmlns:p14="http://schemas.microsoft.com/office/powerpoint/2010/main">
+    <mc:Choice Requires="p14">
       <p:transition p14:dur="250">
         <p:fade/>
       </p:transition>
     </mc:Choice>
-    <mc:Fallback>
+    <mc:Fallback xmlns="">
       <p:transition>
         <p:fade/>
       </p:transition>
@@ -22337,19 +22337,6 @@
 <file path=ppt/slides/slide1.xml><?xml version="1.0" encoding="utf-8"?>
 <p:sld xmlns:a="http://schemas.openxmlformats.org/drawingml/2006/main" xmlns:r="http://schemas.openxmlformats.org/officeDocument/2006/relationships" xmlns:p="http://schemas.openxmlformats.org/presentationml/2006/main">
   <p:cSld>
-    <p:bg>
-      <p:bgPr>
-        <a:blipFill>
-          <a:blip r:embed="rId3">
-            <a:alphaModFix/>
-          </a:blip>
-          <a:stretch>
-            <a:fillRect/>
-          </a:stretch>
-        </a:blipFill>
-        <a:effectLst/>
-      </p:bgPr>
-    </p:bg>
     <p:spTree>
       <p:nvGrpSpPr>
         <p:cNvPr id="1" name="Shape 115"/>
@@ -22438,8 +22425,8 @@
         </p:nvSpPr>
         <p:spPr>
           <a:xfrm>
-            <a:off x="5535069" y="3676829"/>
-            <a:ext cx="5802800" cy="956000"/>
+            <a:off x="5836519" y="3758391"/>
+            <a:ext cx="5802800" cy="1908500"/>
           </a:xfrm>
           <a:prstGeom prst="rect">
             <a:avLst/>
@@ -22452,14 +22439,80 @@
           <a:lstStyle/>
           <a:p>
             <a:pPr marL="0" indent="0"/>
+            <a:endParaRPr lang="en-US" sz="1600" b="1" dirty="0">
+              <a:solidFill>
+                <a:schemeClr val="lt1"/>
+              </a:solidFill>
+            </a:endParaRPr>
+          </a:p>
+          <a:p>
+            <a:pPr marL="0" indent="0"/>
+            <a:endParaRPr lang="en-US" sz="1600" b="1" dirty="0"/>
+          </a:p>
+          <a:p>
+            <a:pPr marL="0" indent="0"/>
+            <a:r>
+              <a:rPr lang="en-US" sz="1600" b="1" dirty="0">
+                <a:solidFill>
+                  <a:schemeClr val="accent3">
+                    <a:lumMod val="20000"/>
+                    <a:lumOff val="80000"/>
+                  </a:schemeClr>
+                </a:solidFill>
+              </a:rPr>
+              <a:t>Business</a:t>
+            </a:r>
             <a:r>
               <a:rPr lang="en-US" dirty="0">
                 <a:solidFill>
                   <a:schemeClr val="lt1"/>
                 </a:solidFill>
               </a:rPr>
-              <a:t>Business Part</a:t>
+              <a:t> Part</a:t>
             </a:r>
+          </a:p>
+          <a:p>
+            <a:pPr marL="0" indent="0"/>
+            <a:endParaRPr lang="en-US" dirty="0">
+              <a:solidFill>
+                <a:schemeClr val="lt1"/>
+              </a:solidFill>
+            </a:endParaRPr>
+          </a:p>
+          <a:p>
+            <a:pPr marL="0" indent="0"/>
+            <a:endParaRPr lang="en-US" dirty="0">
+              <a:solidFill>
+                <a:schemeClr val="lt1"/>
+              </a:solidFill>
+            </a:endParaRPr>
+          </a:p>
+          <a:p>
+            <a:pPr marL="0" indent="0"/>
+            <a:r>
+              <a:rPr lang="en-US" sz="2000" dirty="0"/>
+              <a:t>Presented to</a:t>
+            </a:r>
+          </a:p>
+          <a:p>
+            <a:pPr marL="0" indent="0"/>
+            <a:r>
+              <a:rPr lang="en-US" sz="2000" dirty="0"/>
+              <a:t> </a:t>
+            </a:r>
+            <a:r>
+              <a:rPr lang="en-US" sz="2000" b="1" dirty="0" err="1"/>
+              <a:t>Eng.Omar</a:t>
+            </a:r>
+            <a:r>
+              <a:rPr lang="en-US" sz="2000" b="1" dirty="0"/>
+              <a:t> Samir</a:t>
+            </a:r>
+            <a:endParaRPr lang="en-US" sz="2000" b="1" dirty="0">
+              <a:solidFill>
+                <a:schemeClr val="lt1"/>
+              </a:solidFill>
+            </a:endParaRPr>
           </a:p>
         </p:txBody>
       </p:sp>
@@ -22475,8 +22528,8 @@
         </p:nvSpPr>
         <p:spPr>
           <a:xfrm>
-            <a:off x="6485069" y="1720233"/>
-            <a:ext cx="4852800" cy="2376400"/>
+            <a:off x="6485068" y="1720233"/>
+            <a:ext cx="5281551" cy="2376400"/>
           </a:xfrm>
           <a:prstGeom prst="rect">
             <a:avLst/>
@@ -22601,7 +22654,7 @@
           <p:nvPr/>
         </p:nvPicPr>
         <p:blipFill rotWithShape="1">
-          <a:blip r:embed="rId4">
+          <a:blip r:embed="rId3">
             <a:extLst>
               <a:ext uri="{28A0092B-C50C-407E-A947-70E740481C1C}">
                 <a14:useLocalDpi xmlns:a14="http://schemas.microsoft.com/office/drawing/2010/main" val="0"/>
@@ -22651,29 +22704,188 @@
               <a:srgbClr val="969696"/>
             </a:contourClr>
           </a:sp3d>
-          <a:extLst>
-            <a:ext uri="{909E8E84-426E-40DD-AFC4-6F175D3DCCD1}">
-              <a14:hiddenFill xmlns:a14="http://schemas.microsoft.com/office/drawing/2010/main">
-                <a:solidFill>
-                  <a:srgbClr val="FFFFFF"/>
-                </a:solidFill>
-              </a14:hiddenFill>
-            </a:ext>
-          </a:extLst>
         </p:spPr>
       </p:pic>
+      <p:pic>
+        <p:nvPicPr>
+          <p:cNvPr id="2" name="صورة 1" descr="Faculty of Engineering Cairo University logo">
+            <a:extLst>
+              <a:ext uri="{FF2B5EF4-FFF2-40B4-BE49-F238E27FC236}">
+                <a16:creationId xmlns:a16="http://schemas.microsoft.com/office/drawing/2014/main" id="{594ADCCC-FD33-628A-274D-2AAD96DB312B}"/>
+              </a:ext>
+            </a:extLst>
+          </p:cNvPr>
+          <p:cNvPicPr>
+            <a:picLocks noChangeAspect="1"/>
+          </p:cNvPicPr>
+          <p:nvPr/>
+        </p:nvPicPr>
+        <p:blipFill>
+          <a:blip r:embed="rId4">
+            <a:extLst>
+              <a:ext uri="{28A0092B-C50C-407E-A947-70E740481C1C}">
+                <a14:useLocalDpi xmlns:a14="http://schemas.microsoft.com/office/drawing/2010/main" val="0"/>
+              </a:ext>
+            </a:extLst>
+          </a:blip>
+          <a:srcRect/>
+          <a:stretch>
+            <a:fillRect/>
+          </a:stretch>
+        </p:blipFill>
+        <p:spPr bwMode="auto">
+          <a:xfrm>
+            <a:off x="10287000" y="231537"/>
+            <a:ext cx="1905000" cy="1905000"/>
+          </a:xfrm>
+          <a:prstGeom prst="rect">
+            <a:avLst/>
+          </a:prstGeom>
+          <a:noFill/>
+          <a:ln>
+            <a:noFill/>
+          </a:ln>
+        </p:spPr>
+      </p:pic>
+      <p:sp>
+        <p:nvSpPr>
+          <p:cNvPr id="4" name="مربع نص 3">
+            <a:extLst>
+              <a:ext uri="{FF2B5EF4-FFF2-40B4-BE49-F238E27FC236}">
+                <a16:creationId xmlns:a16="http://schemas.microsoft.com/office/drawing/2014/main" id="{67140024-3D66-BB7D-3CED-A697441B1AC0}"/>
+              </a:ext>
+            </a:extLst>
+          </p:cNvPr>
+          <p:cNvSpPr txBox="1"/>
+          <p:nvPr/>
+        </p:nvSpPr>
+        <p:spPr>
+          <a:xfrm>
+            <a:off x="3516923" y="268167"/>
+            <a:ext cx="4051470" cy="1169551"/>
+          </a:xfrm>
+          <a:prstGeom prst="rect">
+            <a:avLst/>
+          </a:prstGeom>
+          <a:noFill/>
+        </p:spPr>
+        <p:txBody>
+          <a:bodyPr wrap="square">
+            <a:spAutoFit/>
+          </a:bodyPr>
+          <a:lstStyle/>
+          <a:p>
+            <a:r>
+              <a:rPr lang="en-US" sz="1400" dirty="0">
+                <a:effectLst/>
+                <a:latin typeface="Calibri" panose="020F0502020204030204" pitchFamily="34" charset="0"/>
+                <a:ea typeface="Calibri" panose="020F0502020204030204" pitchFamily="34" charset="0"/>
+                <a:cs typeface="Arial" panose="020B0604020202020204" pitchFamily="34" charset="0"/>
+              </a:rPr>
+              <a:t>Cairo university</a:t>
+            </a:r>
+            <a:br>
+              <a:rPr lang="en-US" sz="1400" dirty="0">
+                <a:effectLst/>
+                <a:latin typeface="Calibri" panose="020F0502020204030204" pitchFamily="34" charset="0"/>
+                <a:ea typeface="Calibri" panose="020F0502020204030204" pitchFamily="34" charset="0"/>
+                <a:cs typeface="Arial" panose="020B0604020202020204" pitchFamily="34" charset="0"/>
+              </a:rPr>
+            </a:br>
+            <a:r>
+              <a:rPr lang="en-US" sz="1400" dirty="0">
+                <a:effectLst/>
+                <a:latin typeface="Calibri" panose="020F0502020204030204" pitchFamily="34" charset="0"/>
+                <a:ea typeface="Calibri" panose="020F0502020204030204" pitchFamily="34" charset="0"/>
+                <a:cs typeface="Arial" panose="020B0604020202020204" pitchFamily="34" charset="0"/>
+              </a:rPr>
+              <a:t>Faculty of engineering</a:t>
+            </a:r>
+            <a:br>
+              <a:rPr lang="en-US" sz="1400" dirty="0">
+                <a:effectLst/>
+                <a:latin typeface="Calibri" panose="020F0502020204030204" pitchFamily="34" charset="0"/>
+                <a:ea typeface="Calibri" panose="020F0502020204030204" pitchFamily="34" charset="0"/>
+                <a:cs typeface="Arial" panose="020B0604020202020204" pitchFamily="34" charset="0"/>
+              </a:rPr>
+            </a:br>
+            <a:r>
+              <a:rPr lang="en-US" sz="1400" dirty="0">
+                <a:effectLst/>
+                <a:latin typeface="Calibri" panose="020F0502020204030204" pitchFamily="34" charset="0"/>
+                <a:ea typeface="Calibri" panose="020F0502020204030204" pitchFamily="34" charset="0"/>
+                <a:cs typeface="Arial" panose="020B0604020202020204" pitchFamily="34" charset="0"/>
+              </a:rPr>
+              <a:t>Computer engineering department</a:t>
+            </a:r>
+            <a:br>
+              <a:rPr lang="en-US" sz="1400" dirty="0">
+                <a:effectLst/>
+                <a:latin typeface="Calibri" panose="020F0502020204030204" pitchFamily="34" charset="0"/>
+                <a:ea typeface="Calibri" panose="020F0502020204030204" pitchFamily="34" charset="0"/>
+                <a:cs typeface="Arial" panose="020B0604020202020204" pitchFamily="34" charset="0"/>
+              </a:rPr>
+            </a:br>
+            <a:r>
+              <a:rPr lang="en-US" sz="1400" dirty="0">
+                <a:effectLst/>
+                <a:latin typeface="Calibri" panose="020F0502020204030204" pitchFamily="34" charset="0"/>
+                <a:ea typeface="Calibri" panose="020F0502020204030204" pitchFamily="34" charset="0"/>
+                <a:cs typeface="Arial" panose="020B0604020202020204" pitchFamily="34" charset="0"/>
+              </a:rPr>
+              <a:t>Big Data [</a:t>
+            </a:r>
+            <a:r>
+              <a:rPr lang="en-US" sz="1400" b="1" dirty="0">
+                <a:effectLst/>
+                <a:latin typeface="Calibri" panose="020F0502020204030204" pitchFamily="34" charset="0"/>
+                <a:ea typeface="Calibri" panose="020F0502020204030204" pitchFamily="34" charset="0"/>
+                <a:cs typeface="Arial" panose="020B0604020202020204" pitchFamily="34" charset="0"/>
+              </a:rPr>
+              <a:t>CMP4011</a:t>
+            </a:r>
+            <a:r>
+              <a:rPr lang="en-US" sz="1400" dirty="0">
+                <a:effectLst/>
+                <a:latin typeface="Calibri" panose="020F0502020204030204" pitchFamily="34" charset="0"/>
+                <a:ea typeface="Calibri" panose="020F0502020204030204" pitchFamily="34" charset="0"/>
+                <a:cs typeface="Arial" panose="020B0604020202020204" pitchFamily="34" charset="0"/>
+              </a:rPr>
+              <a:t>] </a:t>
+            </a:r>
+            <a:br>
+              <a:rPr lang="en-US" sz="1400" dirty="0">
+                <a:effectLst/>
+                <a:latin typeface="Calibri" panose="020F0502020204030204" pitchFamily="34" charset="0"/>
+                <a:ea typeface="Calibri" panose="020F0502020204030204" pitchFamily="34" charset="0"/>
+                <a:cs typeface="Arial" panose="020B0604020202020204" pitchFamily="34" charset="0"/>
+              </a:rPr>
+            </a:br>
+            <a:r>
+              <a:rPr lang="en-US" sz="1400" dirty="0">
+                <a:effectLst/>
+                <a:latin typeface="Calibri" panose="020F0502020204030204" pitchFamily="34" charset="0"/>
+                <a:ea typeface="Calibri" panose="020F0502020204030204" pitchFamily="34" charset="0"/>
+                <a:cs typeface="Arial" panose="020B0604020202020204" pitchFamily="34" charset="0"/>
+              </a:rPr>
+              <a:t>Project presentation</a:t>
+            </a:r>
+            <a:endParaRPr lang="ar-EG" sz="1400" dirty="0"/>
+          </a:p>
+        </p:txBody>
+      </p:sp>
     </p:spTree>
   </p:cSld>
   <p:clrMapOvr>
     <a:masterClrMapping/>
   </p:clrMapOvr>
-  <mc:AlternateContent xmlns:mc="http://schemas.openxmlformats.org/markup-compatibility/2006">
-    <mc:Choice xmlns:p14="http://schemas.microsoft.com/office/powerpoint/2010/main" Requires="p14">
+  <mc:AlternateContent xmlns:mc="http://schemas.openxmlformats.org/markup-compatibility/2006" xmlns:p14="http://schemas.microsoft.com/office/powerpoint/2010/main">
+    <mc:Choice Requires="p14">
       <p:transition p14:dur="250">
         <p:fade/>
       </p:transition>
     </mc:Choice>
-    <mc:Fallback>
+    <mc:Fallback xmlns="">
       <p:transition>
         <p:fade/>
       </p:transition>
@@ -23067,13 +23279,13 @@
   <p:clrMapOvr>
     <a:masterClrMapping/>
   </p:clrMapOvr>
-  <mc:AlternateContent xmlns:mc="http://schemas.openxmlformats.org/markup-compatibility/2006">
-    <mc:Choice xmlns:p14="http://schemas.microsoft.com/office/powerpoint/2010/main" Requires="p14">
+  <mc:AlternateContent xmlns:mc="http://schemas.openxmlformats.org/markup-compatibility/2006" xmlns:p14="http://schemas.microsoft.com/office/powerpoint/2010/main">
+    <mc:Choice Requires="p14">
       <p:transition p14:dur="250">
         <p:fade/>
       </p:transition>
     </mc:Choice>
-    <mc:Fallback>
+    <mc:Fallback xmlns="">
       <p:transition>
         <p:fade/>
       </p:transition>
@@ -23362,13 +23574,13 @@
   <p:clrMapOvr>
     <a:masterClrMapping/>
   </p:clrMapOvr>
-  <mc:AlternateContent xmlns:mc="http://schemas.openxmlformats.org/markup-compatibility/2006">
-    <mc:Choice xmlns:p14="http://schemas.microsoft.com/office/powerpoint/2010/main" Requires="p14">
+  <mc:AlternateContent xmlns:mc="http://schemas.openxmlformats.org/markup-compatibility/2006" xmlns:p14="http://schemas.microsoft.com/office/powerpoint/2010/main">
+    <mc:Choice Requires="p14">
       <p:transition p14:dur="250">
         <p:fade/>
       </p:transition>
     </mc:Choice>
-    <mc:Fallback>
+    <mc:Fallback xmlns="">
       <p:transition>
         <p:fade/>
       </p:transition>
@@ -23500,13 +23712,13 @@
   <p:clrMapOvr>
     <a:masterClrMapping/>
   </p:clrMapOvr>
-  <mc:AlternateContent xmlns:mc="http://schemas.openxmlformats.org/markup-compatibility/2006">
-    <mc:Choice xmlns:p14="http://schemas.microsoft.com/office/powerpoint/2010/main" Requires="p14">
+  <mc:AlternateContent xmlns:mc="http://schemas.openxmlformats.org/markup-compatibility/2006" xmlns:p14="http://schemas.microsoft.com/office/powerpoint/2010/main">
+    <mc:Choice Requires="p14">
       <p:transition p14:dur="250">
         <p:fade/>
       </p:transition>
     </mc:Choice>
-    <mc:Fallback>
+    <mc:Fallback xmlns="">
       <p:transition>
         <p:fade/>
       </p:transition>
@@ -23763,13 +23975,13 @@
   <p:clrMapOvr>
     <a:masterClrMapping/>
   </p:clrMapOvr>
-  <mc:AlternateContent xmlns:mc="http://schemas.openxmlformats.org/markup-compatibility/2006">
-    <mc:Choice xmlns:p14="http://schemas.microsoft.com/office/powerpoint/2010/main" Requires="p14">
+  <mc:AlternateContent xmlns:mc="http://schemas.openxmlformats.org/markup-compatibility/2006" xmlns:p14="http://schemas.microsoft.com/office/powerpoint/2010/main">
+    <mc:Choice Requires="p14">
       <p:transition p14:dur="250">
         <p:fade/>
       </p:transition>
     </mc:Choice>
-    <mc:Fallback>
+    <mc:Fallback xmlns="">
       <p:transition>
         <p:fade/>
       </p:transition>
@@ -24050,13 +24262,13 @@
   <p:clrMapOvr>
     <a:masterClrMapping/>
   </p:clrMapOvr>
-  <mc:AlternateContent xmlns:mc="http://schemas.openxmlformats.org/markup-compatibility/2006">
-    <mc:Choice xmlns:p14="http://schemas.microsoft.com/office/powerpoint/2010/main" Requires="p14">
+  <mc:AlternateContent xmlns:mc="http://schemas.openxmlformats.org/markup-compatibility/2006" xmlns:p14="http://schemas.microsoft.com/office/powerpoint/2010/main">
+    <mc:Choice Requires="p14">
       <p:transition p14:dur="250">
         <p:fade/>
       </p:transition>
     </mc:Choice>
-    <mc:Fallback>
+    <mc:Fallback xmlns="">
       <p:transition>
         <p:fade/>
       </p:transition>
@@ -24178,13 +24390,13 @@
   <p:clrMapOvr>
     <a:masterClrMapping/>
   </p:clrMapOvr>
-  <mc:AlternateContent xmlns:mc="http://schemas.openxmlformats.org/markup-compatibility/2006">
-    <mc:Choice xmlns:p14="http://schemas.microsoft.com/office/powerpoint/2010/main" Requires="p14">
+  <mc:AlternateContent xmlns:mc="http://schemas.openxmlformats.org/markup-compatibility/2006" xmlns:p14="http://schemas.microsoft.com/office/powerpoint/2010/main">
+    <mc:Choice Requires="p14">
       <p:transition p14:dur="250">
         <p:fade/>
       </p:transition>
     </mc:Choice>
-    <mc:Fallback>
+    <mc:Fallback xmlns="">
       <p:transition>
         <p:fade/>
       </p:transition>
@@ -24471,13 +24683,13 @@
   <p:clrMapOvr>
     <a:masterClrMapping/>
   </p:clrMapOvr>
-  <mc:AlternateContent xmlns:mc="http://schemas.openxmlformats.org/markup-compatibility/2006">
-    <mc:Choice xmlns:p14="http://schemas.microsoft.com/office/powerpoint/2010/main" Requires="p14">
+  <mc:AlternateContent xmlns:mc="http://schemas.openxmlformats.org/markup-compatibility/2006" xmlns:p14="http://schemas.microsoft.com/office/powerpoint/2010/main">
+    <mc:Choice Requires="p14">
       <p:transition p14:dur="250">
         <p:fade/>
       </p:transition>
     </mc:Choice>
-    <mc:Fallback>
+    <mc:Fallback xmlns="">
       <p:transition>
         <p:fade/>
       </p:transition>
@@ -24667,13 +24879,13 @@
   <p:clrMapOvr>
     <a:masterClrMapping/>
   </p:clrMapOvr>
-  <mc:AlternateContent xmlns:mc="http://schemas.openxmlformats.org/markup-compatibility/2006">
-    <mc:Choice xmlns:p14="http://schemas.microsoft.com/office/powerpoint/2010/main" Requires="p14">
+  <mc:AlternateContent xmlns:mc="http://schemas.openxmlformats.org/markup-compatibility/2006" xmlns:p14="http://schemas.microsoft.com/office/powerpoint/2010/main">
+    <mc:Choice Requires="p14">
       <p:transition p14:dur="250">
         <p:fade/>
       </p:transition>
     </mc:Choice>
-    <mc:Fallback>
+    <mc:Fallback xmlns="">
       <p:transition>
         <p:fade/>
       </p:transition>
@@ -24866,13 +25078,13 @@
   <p:clrMapOvr>
     <a:masterClrMapping/>
   </p:clrMapOvr>
-  <mc:AlternateContent xmlns:mc="http://schemas.openxmlformats.org/markup-compatibility/2006">
-    <mc:Choice xmlns:p14="http://schemas.microsoft.com/office/powerpoint/2010/main" Requires="p14">
+  <mc:AlternateContent xmlns:mc="http://schemas.openxmlformats.org/markup-compatibility/2006" xmlns:p14="http://schemas.microsoft.com/office/powerpoint/2010/main">
+    <mc:Choice Requires="p14">
       <p:transition p14:dur="250">
         <p:fade/>
       </p:transition>
     </mc:Choice>
-    <mc:Fallback>
+    <mc:Fallback xmlns="">
       <p:transition>
         <p:fade/>
       </p:transition>
@@ -25299,13 +25511,13 @@
   <p:clrMapOvr>
     <a:masterClrMapping/>
   </p:clrMapOvr>
-  <mc:AlternateContent xmlns:mc="http://schemas.openxmlformats.org/markup-compatibility/2006">
-    <mc:Choice xmlns:p14="http://schemas.microsoft.com/office/powerpoint/2010/main" Requires="p14">
+  <mc:AlternateContent xmlns:mc="http://schemas.openxmlformats.org/markup-compatibility/2006" xmlns:p14="http://schemas.microsoft.com/office/powerpoint/2010/main">
+    <mc:Choice Requires="p14">
       <p:transition p14:dur="250">
         <p:fade/>
       </p:transition>
     </mc:Choice>
-    <mc:Fallback>
+    <mc:Fallback xmlns="">
       <p:transition>
         <p:fade/>
       </p:transition>
@@ -26197,13 +26409,13 @@
   <p:clrMapOvr>
     <a:masterClrMapping/>
   </p:clrMapOvr>
-  <mc:AlternateContent xmlns:mc="http://schemas.openxmlformats.org/markup-compatibility/2006">
-    <mc:Choice xmlns:p14="http://schemas.microsoft.com/office/powerpoint/2010/main" Requires="p14">
+  <mc:AlternateContent xmlns:mc="http://schemas.openxmlformats.org/markup-compatibility/2006" xmlns:p14="http://schemas.microsoft.com/office/powerpoint/2010/main">
+    <mc:Choice Requires="p14">
       <p:transition p14:dur="250">
         <p:fade/>
       </p:transition>
     </mc:Choice>
-    <mc:Fallback>
+    <mc:Fallback xmlns="">
       <p:transition>
         <p:fade/>
       </p:transition>
@@ -26646,13 +26858,13 @@
   <p:clrMapOvr>
     <a:masterClrMapping/>
   </p:clrMapOvr>
-  <mc:AlternateContent xmlns:mc="http://schemas.openxmlformats.org/markup-compatibility/2006">
-    <mc:Choice xmlns:p14="http://schemas.microsoft.com/office/powerpoint/2010/main" Requires="p14">
+  <mc:AlternateContent xmlns:mc="http://schemas.openxmlformats.org/markup-compatibility/2006" xmlns:p14="http://schemas.microsoft.com/office/powerpoint/2010/main">
+    <mc:Choice Requires="p14">
       <p:transition p14:dur="250">
         <p:fade/>
       </p:transition>
     </mc:Choice>
-    <mc:Fallback>
+    <mc:Fallback xmlns="">
       <p:transition>
         <p:fade/>
       </p:transition>
@@ -27086,13 +27298,13 @@
   <p:clrMapOvr>
     <a:masterClrMapping/>
   </p:clrMapOvr>
-  <mc:AlternateContent xmlns:mc="http://schemas.openxmlformats.org/markup-compatibility/2006">
-    <mc:Choice xmlns:p14="http://schemas.microsoft.com/office/powerpoint/2010/main" Requires="p14">
+  <mc:AlternateContent xmlns:mc="http://schemas.openxmlformats.org/markup-compatibility/2006" xmlns:p14="http://schemas.microsoft.com/office/powerpoint/2010/main">
+    <mc:Choice Requires="p14">
       <p:transition p14:dur="250">
         <p:fade/>
       </p:transition>
     </mc:Choice>
-    <mc:Fallback>
+    <mc:Fallback xmlns="">
       <p:transition>
         <p:fade/>
       </p:transition>
@@ -27522,13 +27734,13 @@
   <p:clrMapOvr>
     <a:masterClrMapping/>
   </p:clrMapOvr>
-  <mc:AlternateContent xmlns:mc="http://schemas.openxmlformats.org/markup-compatibility/2006">
-    <mc:Choice xmlns:p14="http://schemas.microsoft.com/office/powerpoint/2010/main" Requires="p14">
+  <mc:AlternateContent xmlns:mc="http://schemas.openxmlformats.org/markup-compatibility/2006" xmlns:p14="http://schemas.microsoft.com/office/powerpoint/2010/main">
+    <mc:Choice Requires="p14">
       <p:transition p14:dur="250">
         <p:fade/>
       </p:transition>
     </mc:Choice>
-    <mc:Fallback>
+    <mc:Fallback xmlns="">
       <p:transition>
         <p:fade/>
       </p:transition>
@@ -27725,13 +27937,13 @@
   <p:clrMapOvr>
     <a:masterClrMapping/>
   </p:clrMapOvr>
-  <mc:AlternateContent xmlns:mc="http://schemas.openxmlformats.org/markup-compatibility/2006">
-    <mc:Choice xmlns:p14="http://schemas.microsoft.com/office/powerpoint/2010/main" Requires="p14">
+  <mc:AlternateContent xmlns:mc="http://schemas.openxmlformats.org/markup-compatibility/2006" xmlns:p14="http://schemas.microsoft.com/office/powerpoint/2010/main">
+    <mc:Choice Requires="p14">
       <p:transition p14:dur="250">
         <p:fade/>
       </p:transition>
     </mc:Choice>
-    <mc:Fallback>
+    <mc:Fallback xmlns="">
       <p:transition>
         <p:fade/>
       </p:transition>
@@ -27913,13 +28125,13 @@
   <p:clrMapOvr>
     <a:masterClrMapping/>
   </p:clrMapOvr>
-  <mc:AlternateContent xmlns:mc="http://schemas.openxmlformats.org/markup-compatibility/2006">
-    <mc:Choice xmlns:p14="http://schemas.microsoft.com/office/powerpoint/2010/main" Requires="p14">
+  <mc:AlternateContent xmlns:mc="http://schemas.openxmlformats.org/markup-compatibility/2006" xmlns:p14="http://schemas.microsoft.com/office/powerpoint/2010/main">
+    <mc:Choice Requires="p14">
       <p:transition p14:dur="250">
         <p:fade/>
       </p:transition>
     </mc:Choice>
-    <mc:Fallback>
+    <mc:Fallback xmlns="">
       <p:transition>
         <p:fade/>
       </p:transition>
@@ -28101,13 +28313,13 @@
   <p:clrMapOvr>
     <a:masterClrMapping/>
   </p:clrMapOvr>
-  <mc:AlternateContent xmlns:mc="http://schemas.openxmlformats.org/markup-compatibility/2006">
-    <mc:Choice xmlns:p14="http://schemas.microsoft.com/office/powerpoint/2010/main" Requires="p14">
+  <mc:AlternateContent xmlns:mc="http://schemas.openxmlformats.org/markup-compatibility/2006" xmlns:p14="http://schemas.microsoft.com/office/powerpoint/2010/main">
+    <mc:Choice Requires="p14">
       <p:transition p14:dur="250">
         <p:fade/>
       </p:transition>
     </mc:Choice>
-    <mc:Fallback>
+    <mc:Fallback xmlns="">
       <p:transition>
         <p:fade/>
       </p:transition>
@@ -28289,13 +28501,13 @@
   <p:clrMapOvr>
     <a:masterClrMapping/>
   </p:clrMapOvr>
-  <mc:AlternateContent xmlns:mc="http://schemas.openxmlformats.org/markup-compatibility/2006">
-    <mc:Choice xmlns:p14="http://schemas.microsoft.com/office/powerpoint/2010/main" Requires="p14">
+  <mc:AlternateContent xmlns:mc="http://schemas.openxmlformats.org/markup-compatibility/2006" xmlns:p14="http://schemas.microsoft.com/office/powerpoint/2010/main">
+    <mc:Choice Requires="p14">
       <p:transition p14:dur="250">
         <p:fade/>
       </p:transition>
     </mc:Choice>
-    <mc:Fallback>
+    <mc:Fallback xmlns="">
       <p:transition>
         <p:fade/>
       </p:transition>
@@ -28723,13 +28935,13 @@
   <p:clrMapOvr>
     <a:masterClrMapping/>
   </p:clrMapOvr>
-  <mc:AlternateContent xmlns:mc="http://schemas.openxmlformats.org/markup-compatibility/2006">
-    <mc:Choice xmlns:p14="http://schemas.microsoft.com/office/powerpoint/2010/main" Requires="p14">
+  <mc:AlternateContent xmlns:mc="http://schemas.openxmlformats.org/markup-compatibility/2006" xmlns:p14="http://schemas.microsoft.com/office/powerpoint/2010/main">
+    <mc:Choice Requires="p14">
       <p:transition p14:dur="250">
         <p:fade/>
       </p:transition>
     </mc:Choice>
-    <mc:Fallback>
+    <mc:Fallback xmlns="">
       <p:transition>
         <p:fade/>
       </p:transition>
@@ -29157,13 +29369,13 @@
   <p:clrMapOvr>
     <a:masterClrMapping/>
   </p:clrMapOvr>
-  <mc:AlternateContent xmlns:mc="http://schemas.openxmlformats.org/markup-compatibility/2006">
-    <mc:Choice xmlns:p14="http://schemas.microsoft.com/office/powerpoint/2010/main" Requires="p14">
+  <mc:AlternateContent xmlns:mc="http://schemas.openxmlformats.org/markup-compatibility/2006" xmlns:p14="http://schemas.microsoft.com/office/powerpoint/2010/main">
+    <mc:Choice Requires="p14">
       <p:transition p14:dur="250">
         <p:fade/>
       </p:transition>
     </mc:Choice>
-    <mc:Fallback>
+    <mc:Fallback xmlns="">
       <p:transition>
         <p:fade/>
       </p:transition>
@@ -29591,13 +29803,13 @@
   <p:clrMapOvr>
     <a:masterClrMapping/>
   </p:clrMapOvr>
-  <mc:AlternateContent xmlns:mc="http://schemas.openxmlformats.org/markup-compatibility/2006">
-    <mc:Choice xmlns:p14="http://schemas.microsoft.com/office/powerpoint/2010/main" Requires="p14">
+  <mc:AlternateContent xmlns:mc="http://schemas.openxmlformats.org/markup-compatibility/2006" xmlns:p14="http://schemas.microsoft.com/office/powerpoint/2010/main">
+    <mc:Choice Requires="p14">
       <p:transition p14:dur="250">
         <p:fade/>
       </p:transition>
     </mc:Choice>
-    <mc:Fallback>
+    <mc:Fallback xmlns="">
       <p:transition>
         <p:fade/>
       </p:transition>
@@ -30371,13 +30583,13 @@
   <p:clrMapOvr>
     <a:masterClrMapping/>
   </p:clrMapOvr>
-  <mc:AlternateContent xmlns:mc="http://schemas.openxmlformats.org/markup-compatibility/2006">
-    <mc:Choice xmlns:p14="http://schemas.microsoft.com/office/powerpoint/2010/main" Requires="p14">
+  <mc:AlternateContent xmlns:mc="http://schemas.openxmlformats.org/markup-compatibility/2006" xmlns:p14="http://schemas.microsoft.com/office/powerpoint/2010/main">
+    <mc:Choice Requires="p14">
       <p:transition p14:dur="250">
         <p:fade/>
       </p:transition>
     </mc:Choice>
-    <mc:Fallback>
+    <mc:Fallback xmlns="">
       <p:transition>
         <p:fade/>
       </p:transition>
@@ -30805,13 +31017,13 @@
   <p:clrMapOvr>
     <a:masterClrMapping/>
   </p:clrMapOvr>
-  <mc:AlternateContent xmlns:mc="http://schemas.openxmlformats.org/markup-compatibility/2006">
-    <mc:Choice xmlns:p14="http://schemas.microsoft.com/office/powerpoint/2010/main" Requires="p14">
+  <mc:AlternateContent xmlns:mc="http://schemas.openxmlformats.org/markup-compatibility/2006" xmlns:p14="http://schemas.microsoft.com/office/powerpoint/2010/main">
+    <mc:Choice Requires="p14">
       <p:transition p14:dur="250">
         <p:fade/>
       </p:transition>
     </mc:Choice>
-    <mc:Fallback>
+    <mc:Fallback xmlns="">
       <p:transition>
         <p:fade/>
       </p:transition>
@@ -31019,13 +31231,13 @@
   <p:clrMapOvr>
     <a:masterClrMapping/>
   </p:clrMapOvr>
-  <mc:AlternateContent xmlns:mc="http://schemas.openxmlformats.org/markup-compatibility/2006">
-    <mc:Choice xmlns:p14="http://schemas.microsoft.com/office/powerpoint/2010/main" Requires="p14">
+  <mc:AlternateContent xmlns:mc="http://schemas.openxmlformats.org/markup-compatibility/2006" xmlns:p14="http://schemas.microsoft.com/office/powerpoint/2010/main">
+    <mc:Choice Requires="p14">
       <p:transition p14:dur="250">
         <p:fade/>
       </p:transition>
     </mc:Choice>
-    <mc:Fallback>
+    <mc:Fallback xmlns="">
       <p:transition>
         <p:fade/>
       </p:transition>
@@ -31453,13 +31665,13 @@
   <p:clrMapOvr>
     <a:masterClrMapping/>
   </p:clrMapOvr>
-  <mc:AlternateContent xmlns:mc="http://schemas.openxmlformats.org/markup-compatibility/2006">
-    <mc:Choice xmlns:p14="http://schemas.microsoft.com/office/powerpoint/2010/main" Requires="p14">
+  <mc:AlternateContent xmlns:mc="http://schemas.openxmlformats.org/markup-compatibility/2006" xmlns:p14="http://schemas.microsoft.com/office/powerpoint/2010/main">
+    <mc:Choice Requires="p14">
       <p:transition p14:dur="250">
         <p:fade/>
       </p:transition>
     </mc:Choice>
-    <mc:Fallback>
+    <mc:Fallback xmlns="">
       <p:transition>
         <p:fade/>
       </p:transition>
@@ -31887,13 +32099,13 @@
   <p:clrMapOvr>
     <a:masterClrMapping/>
   </p:clrMapOvr>
-  <mc:AlternateContent xmlns:mc="http://schemas.openxmlformats.org/markup-compatibility/2006">
-    <mc:Choice xmlns:p14="http://schemas.microsoft.com/office/powerpoint/2010/main" Requires="p14">
+  <mc:AlternateContent xmlns:mc="http://schemas.openxmlformats.org/markup-compatibility/2006" xmlns:p14="http://schemas.microsoft.com/office/powerpoint/2010/main">
+    <mc:Choice Requires="p14">
       <p:transition p14:dur="250">
         <p:fade/>
       </p:transition>
     </mc:Choice>
-    <mc:Fallback>
+    <mc:Fallback xmlns="">
       <p:transition>
         <p:fade/>
       </p:transition>
@@ -31987,13 +32199,13 @@
   <p:clrMapOvr>
     <a:masterClrMapping/>
   </p:clrMapOvr>
-  <mc:AlternateContent xmlns:mc="http://schemas.openxmlformats.org/markup-compatibility/2006">
-    <mc:Choice xmlns:p14="http://schemas.microsoft.com/office/powerpoint/2010/main" Requires="p14">
+  <mc:AlternateContent xmlns:mc="http://schemas.openxmlformats.org/markup-compatibility/2006" xmlns:p14="http://schemas.microsoft.com/office/powerpoint/2010/main">
+    <mc:Choice Requires="p14">
       <p:transition p14:dur="250">
         <p:fade/>
       </p:transition>
     </mc:Choice>
-    <mc:Fallback>
+    <mc:Fallback xmlns="">
       <p:transition>
         <p:fade/>
       </p:transition>
@@ -32119,13 +32331,13 @@
   <p:clrMapOvr>
     <a:masterClrMapping/>
   </p:clrMapOvr>
-  <mc:AlternateContent xmlns:mc="http://schemas.openxmlformats.org/markup-compatibility/2006">
-    <mc:Choice xmlns:p14="http://schemas.microsoft.com/office/powerpoint/2010/main" Requires="p14">
+  <mc:AlternateContent xmlns:mc="http://schemas.openxmlformats.org/markup-compatibility/2006" xmlns:p14="http://schemas.microsoft.com/office/powerpoint/2010/main">
+    <mc:Choice Requires="p14">
       <p:transition p14:dur="250">
         <p:fade/>
       </p:transition>
     </mc:Choice>
-    <mc:Fallback>
+    <mc:Fallback xmlns="">
       <p:transition>
         <p:fade/>
       </p:transition>
@@ -32713,13 +32925,13 @@
   <p:clrMapOvr>
     <a:masterClrMapping/>
   </p:clrMapOvr>
-  <mc:AlternateContent xmlns:mc="http://schemas.openxmlformats.org/markup-compatibility/2006">
-    <mc:Choice xmlns:p14="http://schemas.microsoft.com/office/powerpoint/2010/main" Requires="p14">
+  <mc:AlternateContent xmlns:mc="http://schemas.openxmlformats.org/markup-compatibility/2006" xmlns:p14="http://schemas.microsoft.com/office/powerpoint/2010/main">
+    <mc:Choice Requires="p14">
       <p:transition p14:dur="250">
         <p:fade/>
       </p:transition>
     </mc:Choice>
-    <mc:Fallback>
+    <mc:Fallback xmlns="">
       <p:transition>
         <p:fade/>
       </p:transition>
@@ -33040,13 +33252,13 @@
   <p:clrMapOvr>
     <a:masterClrMapping/>
   </p:clrMapOvr>
-  <mc:AlternateContent xmlns:mc="http://schemas.openxmlformats.org/markup-compatibility/2006">
-    <mc:Choice xmlns:p14="http://schemas.microsoft.com/office/powerpoint/2010/main" Requires="p14">
+  <mc:AlternateContent xmlns:mc="http://schemas.openxmlformats.org/markup-compatibility/2006" xmlns:p14="http://schemas.microsoft.com/office/powerpoint/2010/main">
+    <mc:Choice Requires="p14">
       <p:transition p14:dur="250">
         <p:fade/>
       </p:transition>
     </mc:Choice>
-    <mc:Fallback>
+    <mc:Fallback xmlns="">
       <p:transition>
         <p:fade/>
       </p:transition>
@@ -33170,13 +33382,13 @@
   <p:clrMapOvr>
     <a:masterClrMapping/>
   </p:clrMapOvr>
-  <mc:AlternateContent xmlns:mc="http://schemas.openxmlformats.org/markup-compatibility/2006">
-    <mc:Choice xmlns:p14="http://schemas.microsoft.com/office/powerpoint/2010/main" Requires="p14">
+  <mc:AlternateContent xmlns:mc="http://schemas.openxmlformats.org/markup-compatibility/2006" xmlns:p14="http://schemas.microsoft.com/office/powerpoint/2010/main">
+    <mc:Choice Requires="p14">
       <p:transition p14:dur="250">
         <p:fade/>
       </p:transition>
     </mc:Choice>
-    <mc:Fallback>
+    <mc:Fallback xmlns="">
       <p:transition>
         <p:fade/>
       </p:transition>
@@ -33518,13 +33730,13 @@
   <p:clrMapOvr>
     <a:masterClrMapping/>
   </p:clrMapOvr>
-  <mc:AlternateContent xmlns:mc="http://schemas.openxmlformats.org/markup-compatibility/2006">
-    <mc:Choice xmlns:p14="http://schemas.microsoft.com/office/powerpoint/2010/main" Requires="p14">
+  <mc:AlternateContent xmlns:mc="http://schemas.openxmlformats.org/markup-compatibility/2006" xmlns:p14="http://schemas.microsoft.com/office/powerpoint/2010/main">
+    <mc:Choice Requires="p14">
       <p:transition p14:dur="250">
         <p:fade/>
       </p:transition>
     </mc:Choice>
-    <mc:Fallback>
+    <mc:Fallback xmlns="">
       <p:transition>
         <p:fade/>
       </p:transition>
@@ -33926,13 +34138,13 @@
   <p:clrMapOvr>
     <a:masterClrMapping/>
   </p:clrMapOvr>
-  <mc:AlternateContent xmlns:mc="http://schemas.openxmlformats.org/markup-compatibility/2006">
-    <mc:Choice xmlns:p14="http://schemas.microsoft.com/office/powerpoint/2010/main" Requires="p14">
+  <mc:AlternateContent xmlns:mc="http://schemas.openxmlformats.org/markup-compatibility/2006" xmlns:p14="http://schemas.microsoft.com/office/powerpoint/2010/main">
+    <mc:Choice Requires="p14">
       <p:transition p14:dur="250">
         <p:fade/>
       </p:transition>
     </mc:Choice>
-    <mc:Fallback>
+    <mc:Fallback xmlns="">
       <p:transition>
         <p:fade/>
       </p:transition>

</xml_diff>